<commit_message>
Bài 6.5: Connecting the host
</commit_message>
<xml_diff>
--- a/Section 6 - Deploying Applications.pptx
+++ b/Section 6 - Deploying Applications.pptx
@@ -204,7 +204,7 @@
           <a:p>
             <a:fld id="{11529BCC-AFAA-394D-AFB2-C1AC1F28673A}" type="datetimeFigureOut">
               <a:rPr lang="en-US" smtClean="0"/>
-              <a:t>7/4/21</a:t>
+              <a:t>3/30/2023</a:t>
             </a:fld>
             <a:endParaRPr lang="en-US"/>
           </a:p>
@@ -1615,7 +1615,7 @@
             <a:fld id="{B61BEF0D-F0BB-DE4B-95CE-6DB70DBA9567}" type="datetimeFigureOut">
               <a:rPr lang="en-US" dirty="0"/>
               <a:pPr/>
-              <a:t>7/4/21</a:t>
+              <a:t>3/30/2023</a:t>
             </a:fld>
             <a:endParaRPr lang="en-US" dirty="0"/>
           </a:p>
@@ -1863,7 +1863,7 @@
             <a:fld id="{B61BEF0D-F0BB-DE4B-95CE-6DB70DBA9567}" type="datetimeFigureOut">
               <a:rPr lang="en-US" dirty="0"/>
               <a:pPr/>
-              <a:t>7/4/21</a:t>
+              <a:t>3/30/2023</a:t>
             </a:fld>
             <a:endParaRPr lang="en-US" dirty="0"/>
           </a:p>
@@ -2174,7 +2174,7 @@
             <a:fld id="{B61BEF0D-F0BB-DE4B-95CE-6DB70DBA9567}" type="datetimeFigureOut">
               <a:rPr lang="en-US" dirty="0"/>
               <a:pPr/>
-              <a:t>7/4/21</a:t>
+              <a:t>3/30/2023</a:t>
             </a:fld>
             <a:endParaRPr lang="en-US" dirty="0"/>
           </a:p>
@@ -2512,7 +2512,7 @@
             <a:fld id="{B61BEF0D-F0BB-DE4B-95CE-6DB70DBA9567}" type="datetimeFigureOut">
               <a:rPr lang="en-US" dirty="0"/>
               <a:pPr/>
-              <a:t>7/4/21</a:t>
+              <a:t>3/30/2023</a:t>
             </a:fld>
             <a:endParaRPr lang="en-US" dirty="0"/>
           </a:p>
@@ -2823,7 +2823,7 @@
             <a:fld id="{B61BEF0D-F0BB-DE4B-95CE-6DB70DBA9567}" type="datetimeFigureOut">
               <a:rPr lang="en-US" dirty="0"/>
               <a:pPr/>
-              <a:t>7/4/21</a:t>
+              <a:t>3/30/2023</a:t>
             </a:fld>
             <a:endParaRPr lang="en-US" dirty="0"/>
           </a:p>
@@ -3213,7 +3213,7 @@
             <a:fld id="{B61BEF0D-F0BB-DE4B-95CE-6DB70DBA9567}" type="datetimeFigureOut">
               <a:rPr lang="en-US" dirty="0"/>
               <a:pPr/>
-              <a:t>7/4/21</a:t>
+              <a:t>3/30/2023</a:t>
             </a:fld>
             <a:endParaRPr lang="en-US" dirty="0"/>
           </a:p>
@@ -3379,7 +3379,7 @@
           <a:p>
             <a:fld id="{55C6B4A9-1611-4792-9094-5F34BCA07E0B}" type="datetimeFigureOut">
               <a:rPr lang="en-US" dirty="0"/>
-              <a:t>7/4/21</a:t>
+              <a:t>3/30/2023</a:t>
             </a:fld>
             <a:endParaRPr lang="en-US" dirty="0"/>
           </a:p>
@@ -3555,7 +3555,7 @@
             <a:fld id="{B61BEF0D-F0BB-DE4B-95CE-6DB70DBA9567}" type="datetimeFigureOut">
               <a:rPr lang="en-US" dirty="0"/>
               <a:pPr/>
-              <a:t>7/4/21</a:t>
+              <a:t>3/30/2023</a:t>
             </a:fld>
             <a:endParaRPr lang="en-US" dirty="0"/>
           </a:p>
@@ -3728,7 +3728,7 @@
             <a:fld id="{B61BEF0D-F0BB-DE4B-95CE-6DB70DBA9567}" type="datetimeFigureOut">
               <a:rPr lang="en-US" dirty="0"/>
               <a:pPr/>
-              <a:t>7/4/21</a:t>
+              <a:t>3/30/2023</a:t>
             </a:fld>
             <a:endParaRPr lang="en-US" dirty="0"/>
           </a:p>
@@ -3972,7 +3972,7 @@
             <a:fld id="{B61BEF0D-F0BB-DE4B-95CE-6DB70DBA9567}" type="datetimeFigureOut">
               <a:rPr lang="en-US" dirty="0"/>
               <a:pPr/>
-              <a:t>7/4/21</a:t>
+              <a:t>3/30/2023</a:t>
             </a:fld>
             <a:endParaRPr lang="en-US" dirty="0"/>
           </a:p>
@@ -4200,7 +4200,7 @@
           <a:p>
             <a:fld id="{EB712588-04B1-427B-82EE-E8DB90309F08}" type="datetimeFigureOut">
               <a:rPr lang="en-US" dirty="0"/>
-              <a:t>7/4/21</a:t>
+              <a:t>3/30/2023</a:t>
             </a:fld>
             <a:endParaRPr lang="en-US" dirty="0"/>
           </a:p>
@@ -4570,7 +4570,7 @@
             <a:fld id="{B61BEF0D-F0BB-DE4B-95CE-6DB70DBA9567}" type="datetimeFigureOut">
               <a:rPr lang="en-US" dirty="0"/>
               <a:pPr/>
-              <a:t>7/4/21</a:t>
+              <a:t>3/30/2023</a:t>
             </a:fld>
             <a:endParaRPr lang="en-US" dirty="0"/>
           </a:p>
@@ -4690,7 +4690,7 @@
             <a:fld id="{B61BEF0D-F0BB-DE4B-95CE-6DB70DBA9567}" type="datetimeFigureOut">
               <a:rPr lang="en-US" dirty="0"/>
               <a:pPr/>
-              <a:t>7/4/21</a:t>
+              <a:t>3/30/2023</a:t>
             </a:fld>
             <a:endParaRPr lang="en-US" dirty="0"/>
           </a:p>
@@ -4782,7 +4782,7 @@
             <a:fld id="{B61BEF0D-F0BB-DE4B-95CE-6DB70DBA9567}" type="datetimeFigureOut">
               <a:rPr lang="en-US" dirty="0"/>
               <a:pPr/>
-              <a:t>7/4/21</a:t>
+              <a:t>3/30/2023</a:t>
             </a:fld>
             <a:endParaRPr lang="en-US" dirty="0"/>
           </a:p>
@@ -5033,7 +5033,7 @@
           <a:p>
             <a:fld id="{42A54C80-263E-416B-A8E0-580EDEADCBDC}" type="datetimeFigureOut">
               <a:rPr lang="en-US" dirty="0"/>
-              <a:t>7/4/21</a:t>
+              <a:t>3/30/2023</a:t>
             </a:fld>
             <a:endParaRPr lang="en-US" dirty="0"/>
           </a:p>
@@ -5292,7 +5292,7 @@
             <a:fld id="{B61BEF0D-F0BB-DE4B-95CE-6DB70DBA9567}" type="datetimeFigureOut">
               <a:rPr lang="en-US" dirty="0"/>
               <a:pPr/>
-              <a:t>7/4/21</a:t>
+              <a:t>3/30/2023</a:t>
             </a:fld>
             <a:endParaRPr lang="en-US" dirty="0"/>
           </a:p>
@@ -6032,7 +6032,7 @@
             <a:fld id="{B61BEF0D-F0BB-DE4B-95CE-6DB70DBA9567}" type="datetimeFigureOut">
               <a:rPr lang="en-US" dirty="0"/>
               <a:pPr/>
-              <a:t>7/4/21</a:t>
+              <a:t>3/30/2023</a:t>
             </a:fld>
             <a:endParaRPr lang="en-US" dirty="0"/>
           </a:p>

</xml_diff>